<commit_message>
User notification using SSE enhancements
</commit_message>
<xml_diff>
--- a/documents/UI-UX-Screens.pptx
+++ b/documents/UI-UX-Screens.pptx
@@ -10,11 +10,12 @@
     <p:sldId id="258" r:id="rId4"/>
     <p:sldId id="259" r:id="rId5"/>
     <p:sldId id="260" r:id="rId6"/>
-    <p:sldId id="261" r:id="rId7"/>
-    <p:sldId id="262" r:id="rId8"/>
-    <p:sldId id="263" r:id="rId9"/>
-    <p:sldId id="264" r:id="rId10"/>
-    <p:sldId id="265" r:id="rId11"/>
+    <p:sldId id="266" r:id="rId7"/>
+    <p:sldId id="261" r:id="rId8"/>
+    <p:sldId id="262" r:id="rId9"/>
+    <p:sldId id="263" r:id="rId10"/>
+    <p:sldId id="264" r:id="rId11"/>
+    <p:sldId id="265" r:id="rId12"/>
   </p:sldIdLst>
   <p:sldSz cx="12192000" cy="6858000"/>
   <p:notesSz cx="6858000" cy="9144000"/>
@@ -268,7 +269,7 @@
           <a:p>
             <a:fld id="{CAEA422C-F695-4BBD-B9B7-642F3B265912}" type="datetimeFigureOut">
               <a:rPr lang="en-US" smtClean="0"/>
-              <a:t>10/13/2023</a:t>
+              <a:t>10/14/2023</a:t>
             </a:fld>
             <a:endParaRPr lang="en-US"/>
           </a:p>
@@ -466,7 +467,7 @@
           <a:p>
             <a:fld id="{CAEA422C-F695-4BBD-B9B7-642F3B265912}" type="datetimeFigureOut">
               <a:rPr lang="en-US" smtClean="0"/>
-              <a:t>10/13/2023</a:t>
+              <a:t>10/14/2023</a:t>
             </a:fld>
             <a:endParaRPr lang="en-US"/>
           </a:p>
@@ -674,7 +675,7 @@
           <a:p>
             <a:fld id="{CAEA422C-F695-4BBD-B9B7-642F3B265912}" type="datetimeFigureOut">
               <a:rPr lang="en-US" smtClean="0"/>
-              <a:t>10/13/2023</a:t>
+              <a:t>10/14/2023</a:t>
             </a:fld>
             <a:endParaRPr lang="en-US"/>
           </a:p>
@@ -872,7 +873,7 @@
           <a:p>
             <a:fld id="{CAEA422C-F695-4BBD-B9B7-642F3B265912}" type="datetimeFigureOut">
               <a:rPr lang="en-US" smtClean="0"/>
-              <a:t>10/13/2023</a:t>
+              <a:t>10/14/2023</a:t>
             </a:fld>
             <a:endParaRPr lang="en-US"/>
           </a:p>
@@ -1147,7 +1148,7 @@
           <a:p>
             <a:fld id="{CAEA422C-F695-4BBD-B9B7-642F3B265912}" type="datetimeFigureOut">
               <a:rPr lang="en-US" smtClean="0"/>
-              <a:t>10/13/2023</a:t>
+              <a:t>10/14/2023</a:t>
             </a:fld>
             <a:endParaRPr lang="en-US"/>
           </a:p>
@@ -1412,7 +1413,7 @@
           <a:p>
             <a:fld id="{CAEA422C-F695-4BBD-B9B7-642F3B265912}" type="datetimeFigureOut">
               <a:rPr lang="en-US" smtClean="0"/>
-              <a:t>10/13/2023</a:t>
+              <a:t>10/14/2023</a:t>
             </a:fld>
             <a:endParaRPr lang="en-US"/>
           </a:p>
@@ -1824,7 +1825,7 @@
           <a:p>
             <a:fld id="{CAEA422C-F695-4BBD-B9B7-642F3B265912}" type="datetimeFigureOut">
               <a:rPr lang="en-US" smtClean="0"/>
-              <a:t>10/13/2023</a:t>
+              <a:t>10/14/2023</a:t>
             </a:fld>
             <a:endParaRPr lang="en-US"/>
           </a:p>
@@ -1965,7 +1966,7 @@
           <a:p>
             <a:fld id="{CAEA422C-F695-4BBD-B9B7-642F3B265912}" type="datetimeFigureOut">
               <a:rPr lang="en-US" smtClean="0"/>
-              <a:t>10/13/2023</a:t>
+              <a:t>10/14/2023</a:t>
             </a:fld>
             <a:endParaRPr lang="en-US"/>
           </a:p>
@@ -2078,7 +2079,7 @@
           <a:p>
             <a:fld id="{CAEA422C-F695-4BBD-B9B7-642F3B265912}" type="datetimeFigureOut">
               <a:rPr lang="en-US" smtClean="0"/>
-              <a:t>10/13/2023</a:t>
+              <a:t>10/14/2023</a:t>
             </a:fld>
             <a:endParaRPr lang="en-US"/>
           </a:p>
@@ -2389,7 +2390,7 @@
           <a:p>
             <a:fld id="{CAEA422C-F695-4BBD-B9B7-642F3B265912}" type="datetimeFigureOut">
               <a:rPr lang="en-US" smtClean="0"/>
-              <a:t>10/13/2023</a:t>
+              <a:t>10/14/2023</a:t>
             </a:fld>
             <a:endParaRPr lang="en-US"/>
           </a:p>
@@ -2677,7 +2678,7 @@
           <a:p>
             <a:fld id="{CAEA422C-F695-4BBD-B9B7-642F3B265912}" type="datetimeFigureOut">
               <a:rPr lang="en-US" smtClean="0"/>
-              <a:t>10/13/2023</a:t>
+              <a:t>10/14/2023</a:t>
             </a:fld>
             <a:endParaRPr lang="en-US"/>
           </a:p>
@@ -2918,7 +2919,7 @@
           <a:p>
             <a:fld id="{CAEA422C-F695-4BBD-B9B7-642F3B265912}" type="datetimeFigureOut">
               <a:rPr lang="en-US" smtClean="0"/>
-              <a:t>10/13/2023</a:t>
+              <a:t>10/14/2023</a:t>
             </a:fld>
             <a:endParaRPr lang="en-US"/>
           </a:p>
@@ -3490,6 +3491,131 @@
           <a:p>
             <a:r>
               <a:rPr lang="en-US" sz="1600" b="1" dirty="0"/>
+              <a:t>End session</a:t>
+            </a:r>
+          </a:p>
+        </p:txBody>
+      </p:sp>
+      <p:sp>
+        <p:nvSpPr>
+          <p:cNvPr id="3" name="Subtitle 2">
+            <a:extLst>
+              <a:ext uri="{FF2B5EF4-FFF2-40B4-BE49-F238E27FC236}">
+                <a16:creationId xmlns:a16="http://schemas.microsoft.com/office/drawing/2014/main" id="{A2C87053-4E50-0A75-1F0F-E0F29C459265}"/>
+              </a:ext>
+            </a:extLst>
+          </p:cNvPr>
+          <p:cNvSpPr>
+            <a:spLocks noGrp="1"/>
+          </p:cNvSpPr>
+          <p:nvPr>
+            <p:ph type="subTitle" idx="1"/>
+          </p:nvPr>
+        </p:nvSpPr>
+        <p:spPr>
+          <a:xfrm>
+            <a:off x="-1" y="634720"/>
+            <a:ext cx="12191999" cy="6223280"/>
+          </a:xfrm>
+        </p:spPr>
+        <p:txBody>
+          <a:bodyPr/>
+          <a:lstStyle/>
+          <a:p>
+            <a:endParaRPr lang="en-US" dirty="0"/>
+          </a:p>
+        </p:txBody>
+      </p:sp>
+      <p:pic>
+        <p:nvPicPr>
+          <p:cNvPr id="6" name="Picture 5">
+            <a:extLst>
+              <a:ext uri="{FF2B5EF4-FFF2-40B4-BE49-F238E27FC236}">
+                <a16:creationId xmlns:a16="http://schemas.microsoft.com/office/drawing/2014/main" id="{5D761403-B32A-F661-05FE-89B0E4AA4B97}"/>
+              </a:ext>
+            </a:extLst>
+          </p:cNvPr>
+          <p:cNvPicPr>
+            <a:picLocks noChangeAspect="1"/>
+          </p:cNvPicPr>
+          <p:nvPr/>
+        </p:nvPicPr>
+        <p:blipFill>
+          <a:blip r:embed="rId2"/>
+          <a:stretch>
+            <a:fillRect/>
+          </a:stretch>
+        </p:blipFill>
+        <p:spPr>
+          <a:xfrm>
+            <a:off x="80682" y="634720"/>
+            <a:ext cx="12039600" cy="6106738"/>
+          </a:xfrm>
+          <a:prstGeom prst="rect">
+            <a:avLst/>
+          </a:prstGeom>
+        </p:spPr>
+      </p:pic>
+    </p:spTree>
+    <p:extLst>
+      <p:ext uri="{BB962C8B-B14F-4D97-AF65-F5344CB8AC3E}">
+        <p14:creationId xmlns:p14="http://schemas.microsoft.com/office/powerpoint/2010/main" val="2430473777"/>
+      </p:ext>
+    </p:extLst>
+  </p:cSld>
+  <p:clrMapOvr>
+    <a:masterClrMapping/>
+  </p:clrMapOvr>
+</p:sld>
+</file>
+
+<file path=ppt/slides/slide11.xml><?xml version="1.0" encoding="utf-8"?>
+<p:sld xmlns:a="http://schemas.openxmlformats.org/drawingml/2006/main" xmlns:r="http://schemas.openxmlformats.org/officeDocument/2006/relationships" xmlns:p="http://schemas.openxmlformats.org/presentationml/2006/main">
+  <p:cSld>
+    <p:spTree>
+      <p:nvGrpSpPr>
+        <p:cNvPr id="1" name=""/>
+        <p:cNvGrpSpPr/>
+        <p:nvPr/>
+      </p:nvGrpSpPr>
+      <p:grpSpPr>
+        <a:xfrm>
+          <a:off x="0" y="0"/>
+          <a:ext cx="0" cy="0"/>
+          <a:chOff x="0" y="0"/>
+          <a:chExt cx="0" cy="0"/>
+        </a:xfrm>
+      </p:grpSpPr>
+      <p:sp>
+        <p:nvSpPr>
+          <p:cNvPr id="2" name="Title 1">
+            <a:extLst>
+              <a:ext uri="{FF2B5EF4-FFF2-40B4-BE49-F238E27FC236}">
+                <a16:creationId xmlns:a16="http://schemas.microsoft.com/office/drawing/2014/main" id="{2059FB0A-EDA2-237A-1294-65A1AEE844B9}"/>
+              </a:ext>
+            </a:extLst>
+          </p:cNvPr>
+          <p:cNvSpPr>
+            <a:spLocks noGrp="1"/>
+          </p:cNvSpPr>
+          <p:nvPr>
+            <p:ph type="ctrTitle"/>
+          </p:nvPr>
+        </p:nvSpPr>
+        <p:spPr>
+          <a:xfrm>
+            <a:off x="0" y="0"/>
+            <a:ext cx="12192000" cy="475129"/>
+          </a:xfrm>
+        </p:spPr>
+        <p:txBody>
+          <a:bodyPr>
+            <a:normAutofit/>
+          </a:bodyPr>
+          <a:lstStyle/>
+          <a:p>
+            <a:r>
+              <a:rPr lang="en-US" sz="1600" b="1" dirty="0"/>
               <a:t>Delete session</a:t>
             </a:r>
           </a:p>
@@ -4115,7 +4241,7 @@
           <a:p>
             <a:r>
               <a:rPr lang="en-US" sz="1600" b="1" dirty="0"/>
-              <a:t>View session</a:t>
+              <a:t>Create session – User Notification</a:t>
             </a:r>
           </a:p>
         </p:txBody>
@@ -4152,10 +4278,10 @@
       </p:sp>
       <p:pic>
         <p:nvPicPr>
-          <p:cNvPr id="6" name="Picture 5">
-            <a:extLst>
-              <a:ext uri="{FF2B5EF4-FFF2-40B4-BE49-F238E27FC236}">
-                <a16:creationId xmlns:a16="http://schemas.microsoft.com/office/drawing/2014/main" id="{3EFAE4D6-4F00-AAAA-B929-2A6FFD4ADF42}"/>
+          <p:cNvPr id="5" name="Picture 4">
+            <a:extLst>
+              <a:ext uri="{FF2B5EF4-FFF2-40B4-BE49-F238E27FC236}">
+                <a16:creationId xmlns:a16="http://schemas.microsoft.com/office/drawing/2014/main" id="{51C276ED-3BDB-D4E2-E961-24FD42AD5B4D}"/>
               </a:ext>
             </a:extLst>
           </p:cNvPr>
@@ -4172,7 +4298,7 @@
         </p:blipFill>
         <p:spPr>
           <a:xfrm>
-            <a:off x="0" y="532048"/>
+            <a:off x="0" y="479630"/>
             <a:ext cx="12192000" cy="6223280"/>
           </a:xfrm>
           <a:prstGeom prst="rect">
@@ -4183,7 +4309,7 @@
     </p:spTree>
     <p:extLst>
       <p:ext uri="{BB962C8B-B14F-4D97-AF65-F5344CB8AC3E}">
-        <p14:creationId xmlns:p14="http://schemas.microsoft.com/office/powerpoint/2010/main" val="4165713287"/>
+        <p14:creationId xmlns:p14="http://schemas.microsoft.com/office/powerpoint/2010/main" val="757210179"/>
       </p:ext>
     </p:extLst>
   </p:cSld>
@@ -4240,7 +4366,7 @@
           <a:p>
             <a:r>
               <a:rPr lang="en-US" sz="1600" b="1" dirty="0"/>
-              <a:t>Edit session</a:t>
+              <a:t>View session</a:t>
             </a:r>
           </a:p>
         </p:txBody>
@@ -4280,7 +4406,7 @@
           <p:cNvPr id="6" name="Picture 5">
             <a:extLst>
               <a:ext uri="{FF2B5EF4-FFF2-40B4-BE49-F238E27FC236}">
-                <a16:creationId xmlns:a16="http://schemas.microsoft.com/office/drawing/2014/main" id="{B163B001-5246-541A-D141-482E332C8D42}"/>
+                <a16:creationId xmlns:a16="http://schemas.microsoft.com/office/drawing/2014/main" id="{3EFAE4D6-4F00-AAAA-B929-2A6FFD4ADF42}"/>
               </a:ext>
             </a:extLst>
           </p:cNvPr>
@@ -4297,8 +4423,8 @@
         </p:blipFill>
         <p:spPr>
           <a:xfrm>
-            <a:off x="62752" y="634720"/>
-            <a:ext cx="12012707" cy="6223280"/>
+            <a:off x="0" y="532048"/>
+            <a:ext cx="12192000" cy="6223280"/>
           </a:xfrm>
           <a:prstGeom prst="rect">
             <a:avLst/>
@@ -4308,7 +4434,7 @@
     </p:spTree>
     <p:extLst>
       <p:ext uri="{BB962C8B-B14F-4D97-AF65-F5344CB8AC3E}">
-        <p14:creationId xmlns:p14="http://schemas.microsoft.com/office/powerpoint/2010/main" val="1154174478"/>
+        <p14:creationId xmlns:p14="http://schemas.microsoft.com/office/powerpoint/2010/main" val="4165713287"/>
       </p:ext>
     </p:extLst>
   </p:cSld>
@@ -4365,7 +4491,7 @@
           <a:p>
             <a:r>
               <a:rPr lang="en-US" sz="1600" b="1" dirty="0"/>
-              <a:t>Suggest a restaurant to session</a:t>
+              <a:t>Edit session</a:t>
             </a:r>
           </a:p>
         </p:txBody>
@@ -4402,10 +4528,10 @@
       </p:sp>
       <p:pic>
         <p:nvPicPr>
-          <p:cNvPr id="5" name="Picture 4">
-            <a:extLst>
-              <a:ext uri="{FF2B5EF4-FFF2-40B4-BE49-F238E27FC236}">
-                <a16:creationId xmlns:a16="http://schemas.microsoft.com/office/drawing/2014/main" id="{0291FCAC-BE9A-79BA-DAC3-D8229649FE37}"/>
+          <p:cNvPr id="6" name="Picture 5">
+            <a:extLst>
+              <a:ext uri="{FF2B5EF4-FFF2-40B4-BE49-F238E27FC236}">
+                <a16:creationId xmlns:a16="http://schemas.microsoft.com/office/drawing/2014/main" id="{B163B001-5246-541A-D141-482E332C8D42}"/>
               </a:ext>
             </a:extLst>
           </p:cNvPr>
@@ -4422,8 +4548,8 @@
         </p:blipFill>
         <p:spPr>
           <a:xfrm>
-            <a:off x="71718" y="634720"/>
-            <a:ext cx="12039600" cy="6223280"/>
+            <a:off x="62752" y="634720"/>
+            <a:ext cx="12012707" cy="6223280"/>
           </a:xfrm>
           <a:prstGeom prst="rect">
             <a:avLst/>
@@ -4433,7 +4559,7 @@
     </p:spTree>
     <p:extLst>
       <p:ext uri="{BB962C8B-B14F-4D97-AF65-F5344CB8AC3E}">
-        <p14:creationId xmlns:p14="http://schemas.microsoft.com/office/powerpoint/2010/main" val="310292323"/>
+        <p14:creationId xmlns:p14="http://schemas.microsoft.com/office/powerpoint/2010/main" val="1154174478"/>
       </p:ext>
     </p:extLst>
   </p:cSld>
@@ -4490,7 +4616,7 @@
           <a:p>
             <a:r>
               <a:rPr lang="en-US" sz="1600" b="1" dirty="0"/>
-              <a:t>End session</a:t>
+              <a:t>Suggest a restaurant to session</a:t>
             </a:r>
           </a:p>
         </p:txBody>
@@ -4527,10 +4653,10 @@
       </p:sp>
       <p:pic>
         <p:nvPicPr>
-          <p:cNvPr id="6" name="Picture 5">
-            <a:extLst>
-              <a:ext uri="{FF2B5EF4-FFF2-40B4-BE49-F238E27FC236}">
-                <a16:creationId xmlns:a16="http://schemas.microsoft.com/office/drawing/2014/main" id="{5D761403-B32A-F661-05FE-89B0E4AA4B97}"/>
+          <p:cNvPr id="5" name="Picture 4">
+            <a:extLst>
+              <a:ext uri="{FF2B5EF4-FFF2-40B4-BE49-F238E27FC236}">
+                <a16:creationId xmlns:a16="http://schemas.microsoft.com/office/drawing/2014/main" id="{0291FCAC-BE9A-79BA-DAC3-D8229649FE37}"/>
               </a:ext>
             </a:extLst>
           </p:cNvPr>
@@ -4547,8 +4673,8 @@
         </p:blipFill>
         <p:spPr>
           <a:xfrm>
-            <a:off x="80682" y="634720"/>
-            <a:ext cx="12039600" cy="6106738"/>
+            <a:off x="71718" y="634720"/>
+            <a:ext cx="12039600" cy="6223280"/>
           </a:xfrm>
           <a:prstGeom prst="rect">
             <a:avLst/>
@@ -4558,7 +4684,7 @@
     </p:spTree>
     <p:extLst>
       <p:ext uri="{BB962C8B-B14F-4D97-AF65-F5344CB8AC3E}">
-        <p14:creationId xmlns:p14="http://schemas.microsoft.com/office/powerpoint/2010/main" val="2430473777"/>
+        <p14:creationId xmlns:p14="http://schemas.microsoft.com/office/powerpoint/2010/main" val="310292323"/>
       </p:ext>
     </p:extLst>
   </p:cSld>

</xml_diff>